<commit_message>
modified ppt, ss lab codes
</commit_message>
<xml_diff>
--- a/Design Project/Voice Based Email System for the Visually Impaired 1.pptx
+++ b/Design Project/Voice Based Email System for the Visually Impaired 1.pptx
@@ -4253,7 +4253,7 @@
           <a:p>
             <a:fld id="{78ABE3C1-DBE1-495D-B57B-2849774B866A}" type="datetimeFigureOut">
               <a:rPr lang="en-US" smtClean="0"/>
-              <a:t>9/17/2019</a:t>
+              <a:t>9/18/2019</a:t>
             </a:fld>
             <a:endParaRPr lang="en-US" dirty="0"/>
           </a:p>
@@ -5241,7 +5241,7 @@
           <a:p>
             <a:fld id="{D82014A1-A632-4878-A0D3-F52BA7563730}" type="datetimeFigureOut">
               <a:rPr lang="en-US" smtClean="0"/>
-              <a:t>9/17/2019</a:t>
+              <a:t>9/18/2019</a:t>
             </a:fld>
             <a:endParaRPr lang="en-US" dirty="0"/>
           </a:p>
@@ -13872,6 +13872,42 @@
           </a:p>
         </p:txBody>
       </p:sp>
+      <p:pic>
+        <p:nvPicPr>
+          <p:cNvPr id="3" name="Graphic 2">
+            <a:extLst>
+              <a:ext uri="{FF2B5EF4-FFF2-40B4-BE49-F238E27FC236}">
+                <a16:creationId xmlns:a16="http://schemas.microsoft.com/office/drawing/2014/main" id="{BD9041D7-74E8-4D0A-A8C2-BD7CE2987BE2}"/>
+              </a:ext>
+            </a:extLst>
+          </p:cNvPr>
+          <p:cNvPicPr>
+            <a:picLocks noChangeAspect="1"/>
+          </p:cNvPicPr>
+          <p:nvPr/>
+        </p:nvPicPr>
+        <p:blipFill>
+          <a:blip r:embed="rId3">
+            <a:extLst>
+              <a:ext uri="{96DAC541-7B7A-43D3-8B79-37D633B846F1}">
+                <asvg:svgBlip xmlns:asvg="http://schemas.microsoft.com/office/drawing/2016/SVG/main" r:embed="rId4"/>
+              </a:ext>
+            </a:extLst>
+          </a:blip>
+          <a:stretch>
+            <a:fillRect/>
+          </a:stretch>
+        </p:blipFill>
+        <p:spPr>
+          <a:xfrm>
+            <a:off x="4160872" y="1461200"/>
+            <a:ext cx="4983128" cy="3664599"/>
+          </a:xfrm>
+          <a:prstGeom prst="rect">
+            <a:avLst/>
+          </a:prstGeom>
+        </p:spPr>
+      </p:pic>
     </p:spTree>
     <p:extLst>
       <p:ext uri="{BB962C8B-B14F-4D97-AF65-F5344CB8AC3E}">

</xml_diff>